<commit_message>
a few new slides
</commit_message>
<xml_diff>
--- a/ClassMaterials/ProgramsAboutSlists/follow the grammar.pptx
+++ b/ClassMaterials/ProgramsAboutSlists/follow the grammar.pptx
@@ -8,8 +8,9 @@
     <p:sldId id="256" r:id="rId2"/>
     <p:sldId id="257" r:id="rId3"/>
     <p:sldId id="258" r:id="rId4"/>
-    <p:sldId id="259" r:id="rId5"/>
-    <p:sldId id="260" r:id="rId6"/>
+    <p:sldId id="261" r:id="rId5"/>
+    <p:sldId id="259" r:id="rId6"/>
+    <p:sldId id="260" r:id="rId7"/>
   </p:sldIdLst>
   <p:sldSz cx="12192000" cy="6858000"/>
   <p:notesSz cx="6858000" cy="9144000"/>
@@ -263,7 +264,7 @@
           <a:p>
             <a:fld id="{0F1601B6-875F-4DF8-83C8-0E96F00E1567}" type="datetimeFigureOut">
               <a:rPr lang="en-US" smtClean="0"/>
-              <a:t>9/17/2024</a:t>
+              <a:t>9/16/2025</a:t>
             </a:fld>
             <a:endParaRPr lang="en-US"/>
           </a:p>
@@ -461,7 +462,7 @@
           <a:p>
             <a:fld id="{0F1601B6-875F-4DF8-83C8-0E96F00E1567}" type="datetimeFigureOut">
               <a:rPr lang="en-US" smtClean="0"/>
-              <a:t>9/17/2024</a:t>
+              <a:t>9/16/2025</a:t>
             </a:fld>
             <a:endParaRPr lang="en-US"/>
           </a:p>
@@ -669,7 +670,7 @@
           <a:p>
             <a:fld id="{0F1601B6-875F-4DF8-83C8-0E96F00E1567}" type="datetimeFigureOut">
               <a:rPr lang="en-US" smtClean="0"/>
-              <a:t>9/17/2024</a:t>
+              <a:t>9/16/2025</a:t>
             </a:fld>
             <a:endParaRPr lang="en-US"/>
           </a:p>
@@ -867,7 +868,7 @@
           <a:p>
             <a:fld id="{0F1601B6-875F-4DF8-83C8-0E96F00E1567}" type="datetimeFigureOut">
               <a:rPr lang="en-US" smtClean="0"/>
-              <a:t>9/17/2024</a:t>
+              <a:t>9/16/2025</a:t>
             </a:fld>
             <a:endParaRPr lang="en-US"/>
           </a:p>
@@ -1142,7 +1143,7 @@
           <a:p>
             <a:fld id="{0F1601B6-875F-4DF8-83C8-0E96F00E1567}" type="datetimeFigureOut">
               <a:rPr lang="en-US" smtClean="0"/>
-              <a:t>9/17/2024</a:t>
+              <a:t>9/16/2025</a:t>
             </a:fld>
             <a:endParaRPr lang="en-US"/>
           </a:p>
@@ -1407,7 +1408,7 @@
           <a:p>
             <a:fld id="{0F1601B6-875F-4DF8-83C8-0E96F00E1567}" type="datetimeFigureOut">
               <a:rPr lang="en-US" smtClean="0"/>
-              <a:t>9/17/2024</a:t>
+              <a:t>9/16/2025</a:t>
             </a:fld>
             <a:endParaRPr lang="en-US"/>
           </a:p>
@@ -1819,7 +1820,7 @@
           <a:p>
             <a:fld id="{0F1601B6-875F-4DF8-83C8-0E96F00E1567}" type="datetimeFigureOut">
               <a:rPr lang="en-US" smtClean="0"/>
-              <a:t>9/17/2024</a:t>
+              <a:t>9/16/2025</a:t>
             </a:fld>
             <a:endParaRPr lang="en-US"/>
           </a:p>
@@ -1960,7 +1961,7 @@
           <a:p>
             <a:fld id="{0F1601B6-875F-4DF8-83C8-0E96F00E1567}" type="datetimeFigureOut">
               <a:rPr lang="en-US" smtClean="0"/>
-              <a:t>9/17/2024</a:t>
+              <a:t>9/16/2025</a:t>
             </a:fld>
             <a:endParaRPr lang="en-US"/>
           </a:p>
@@ -2073,7 +2074,7 @@
           <a:p>
             <a:fld id="{0F1601B6-875F-4DF8-83C8-0E96F00E1567}" type="datetimeFigureOut">
               <a:rPr lang="en-US" smtClean="0"/>
-              <a:t>9/17/2024</a:t>
+              <a:t>9/16/2025</a:t>
             </a:fld>
             <a:endParaRPr lang="en-US"/>
           </a:p>
@@ -2384,7 +2385,7 @@
           <a:p>
             <a:fld id="{0F1601B6-875F-4DF8-83C8-0E96F00E1567}" type="datetimeFigureOut">
               <a:rPr lang="en-US" smtClean="0"/>
-              <a:t>9/17/2024</a:t>
+              <a:t>9/16/2025</a:t>
             </a:fld>
             <a:endParaRPr lang="en-US"/>
           </a:p>
@@ -2672,7 +2673,7 @@
           <a:p>
             <a:fld id="{0F1601B6-875F-4DF8-83C8-0E96F00E1567}" type="datetimeFigureOut">
               <a:rPr lang="en-US" smtClean="0"/>
-              <a:t>9/17/2024</a:t>
+              <a:t>9/16/2025</a:t>
             </a:fld>
             <a:endParaRPr lang="en-US"/>
           </a:p>
@@ -2913,7 +2914,7 @@
           <a:p>
             <a:fld id="{0F1601B6-875F-4DF8-83C8-0E96F00E1567}" type="datetimeFigureOut">
               <a:rPr lang="en-US" smtClean="0"/>
-              <a:t>9/17/2024</a:t>
+              <a:t>9/16/2025</a:t>
             </a:fld>
             <a:endParaRPr lang="en-US"/>
           </a:p>
@@ -4692,6 +4693,115 @@
           <p:cNvPr id="2" name="Title 1">
             <a:extLst>
               <a:ext uri="{FF2B5EF4-FFF2-40B4-BE49-F238E27FC236}">
+                <a16:creationId xmlns:a16="http://schemas.microsoft.com/office/drawing/2014/main" id="{398222E9-6C6B-7CC2-DDA5-386791D58B42}"/>
+              </a:ext>
+            </a:extLst>
+          </p:cNvPr>
+          <p:cNvSpPr>
+            <a:spLocks noGrp="1"/>
+          </p:cNvSpPr>
+          <p:nvPr>
+            <p:ph type="title"/>
+          </p:nvPr>
+        </p:nvSpPr>
+        <p:spPr/>
+        <p:txBody>
+          <a:bodyPr/>
+          <a:lstStyle/>
+          <a:p>
+            <a:r>
+              <a:rPr lang="en-US" dirty="0"/>
+              <a:t>The basic idea of “following the grammar”</a:t>
+            </a:r>
+          </a:p>
+        </p:txBody>
+      </p:sp>
+      <p:sp>
+        <p:nvSpPr>
+          <p:cNvPr id="3" name="Content Placeholder 2">
+            <a:extLst>
+              <a:ext uri="{FF2B5EF4-FFF2-40B4-BE49-F238E27FC236}">
+                <a16:creationId xmlns:a16="http://schemas.microsoft.com/office/drawing/2014/main" id="{62696B5F-71C2-0FA5-1768-AAB57DF38001}"/>
+              </a:ext>
+            </a:extLst>
+          </p:cNvPr>
+          <p:cNvSpPr>
+            <a:spLocks noGrp="1"/>
+          </p:cNvSpPr>
+          <p:nvPr>
+            <p:ph sz="half" idx="1"/>
+          </p:nvPr>
+        </p:nvSpPr>
+        <p:spPr>
+          <a:xfrm>
+            <a:off x="838199" y="1825625"/>
+            <a:ext cx="9288439" cy="4351338"/>
+          </a:xfrm>
+        </p:spPr>
+        <p:txBody>
+          <a:bodyPr/>
+          <a:lstStyle/>
+          <a:p>
+            <a:r>
+              <a:rPr lang="en-US" dirty="0"/>
+              <a:t>Your function should consume some particular non-terminal (usually the start symbol)</a:t>
+            </a:r>
+          </a:p>
+          <a:p>
+            <a:r>
+              <a:rPr lang="en-US" dirty="0"/>
+              <a:t>Look at the grammar to ensure that you have covered every possible case of this nonterminal – you function should “make sense” of each of these cases</a:t>
+            </a:r>
+          </a:p>
+          <a:p>
+            <a:r>
+              <a:rPr lang="en-US" dirty="0"/>
+              <a:t>Do NOT have cases that are not possible for this nonterminal – trying to make your function “make sense” in these cases will confuse you</a:t>
+            </a:r>
+          </a:p>
+          <a:p>
+            <a:r>
+              <a:rPr lang="en-US" dirty="0"/>
+              <a:t>In general, your strategy is usually to recurse into the parts of the grammar that have your non-terminal</a:t>
+            </a:r>
+          </a:p>
+        </p:txBody>
+      </p:sp>
+    </p:spTree>
+    <p:extLst>
+      <p:ext uri="{BB962C8B-B14F-4D97-AF65-F5344CB8AC3E}">
+        <p14:creationId xmlns:p14="http://schemas.microsoft.com/office/powerpoint/2010/main" val="2297624866"/>
+      </p:ext>
+    </p:extLst>
+  </p:cSld>
+  <p:clrMapOvr>
+    <a:masterClrMapping/>
+  </p:clrMapOvr>
+</p:sld>
+</file>
+
+<file path=ppt/slides/slide5.xml><?xml version="1.0" encoding="utf-8"?>
+<p:sld xmlns:a="http://schemas.openxmlformats.org/drawingml/2006/main" xmlns:r="http://schemas.openxmlformats.org/officeDocument/2006/relationships" xmlns:p="http://schemas.openxmlformats.org/presentationml/2006/main">
+  <p:cSld>
+    <p:spTree>
+      <p:nvGrpSpPr>
+        <p:cNvPr id="1" name=""/>
+        <p:cNvGrpSpPr/>
+        <p:nvPr/>
+      </p:nvGrpSpPr>
+      <p:grpSpPr>
+        <a:xfrm>
+          <a:off x="0" y="0"/>
+          <a:ext cx="0" cy="0"/>
+          <a:chOff x="0" y="0"/>
+          <a:chExt cx="0" cy="0"/>
+        </a:xfrm>
+      </p:grpSpPr>
+      <p:sp>
+        <p:nvSpPr>
+          <p:cNvPr id="2" name="Title 1">
+            <a:extLst>
+              <a:ext uri="{FF2B5EF4-FFF2-40B4-BE49-F238E27FC236}">
                 <a16:creationId xmlns:a16="http://schemas.microsoft.com/office/drawing/2014/main" id="{D048A6EF-A0E9-1056-4C5B-2778240EA0A1}"/>
               </a:ext>
             </a:extLst>
@@ -4896,19 +5006,7 @@
               <a:rPr lang="en-US" sz="2000" dirty="0" err="1">
                 <a:latin typeface="Consolas" panose="020B0609020204030204" pitchFamily="49" charset="0"/>
               </a:rPr>
-              <a:t>cadr</a:t>
-            </a:r>
-            <a:r>
-              <a:rPr lang="en-US" sz="2000" dirty="0">
-                <a:latin typeface="Consolas" panose="020B0609020204030204" pitchFamily="49" charset="0"/>
-              </a:rPr>
-              <a:t> and </a:t>
-            </a:r>
-            <a:r>
-              <a:rPr lang="en-US" sz="2000" dirty="0" err="1">
-                <a:latin typeface="Consolas" panose="020B0609020204030204" pitchFamily="49" charset="0"/>
-              </a:rPr>
-              <a:t>cddr</a:t>
+              <a:t>cdr</a:t>
             </a:r>
             <a:r>
               <a:rPr lang="en-US" sz="2000" dirty="0">
@@ -5133,6 +5231,72 @@
           </a:p>
         </p:txBody>
       </p:sp>
+      <p:sp>
+        <p:nvSpPr>
+          <p:cNvPr id="4" name="TextBox 3">
+            <a:extLst>
+              <a:ext uri="{FF2B5EF4-FFF2-40B4-BE49-F238E27FC236}">
+                <a16:creationId xmlns:a16="http://schemas.microsoft.com/office/drawing/2014/main" id="{9B215BB5-06AD-4C2A-0119-8AFD714313A1}"/>
+              </a:ext>
+            </a:extLst>
+          </p:cNvPr>
+          <p:cNvSpPr txBox="1"/>
+          <p:nvPr/>
+        </p:nvSpPr>
+        <p:spPr>
+          <a:xfrm>
+            <a:off x="682388" y="5527343"/>
+            <a:ext cx="10654520" cy="1200329"/>
+          </a:xfrm>
+          <a:prstGeom prst="rect">
+            <a:avLst/>
+          </a:prstGeom>
+          <a:noFill/>
+        </p:spPr>
+        <p:txBody>
+          <a:bodyPr wrap="none" rtlCol="0">
+            <a:spAutoFit/>
+          </a:bodyPr>
+          <a:lstStyle/>
+          <a:p>
+            <a:r>
+              <a:rPr lang="en-US" dirty="0"/>
+              <a:t>This is still “following the grammar” for a situation in which we need to treat </a:t>
+            </a:r>
+            <a:r>
+              <a:rPr lang="en-US" dirty="0" err="1"/>
+              <a:t>slists</a:t>
+            </a:r>
+            <a:r>
+              <a:rPr lang="en-US" dirty="0"/>
+              <a:t> that have two symbols at</a:t>
+            </a:r>
+          </a:p>
+          <a:p>
+            <a:r>
+              <a:rPr lang="en-US" dirty="0"/>
+              <a:t>The front differently (e.g. maybe we want to remove repeated symbols or something).</a:t>
+            </a:r>
+          </a:p>
+          <a:p>
+            <a:endParaRPr lang="en-US" dirty="0"/>
+          </a:p>
+          <a:p>
+            <a:r>
+              <a:rPr lang="en-US" dirty="0"/>
+              <a:t>1.  It handles every possible </a:t>
+            </a:r>
+            <a:r>
+              <a:rPr lang="en-US" dirty="0" err="1"/>
+              <a:t>slist</a:t>
+            </a:r>
+            <a:r>
+              <a:rPr lang="en-US" dirty="0"/>
+              <a:t> case 2.  No invalid cases are covered</a:t>
+            </a:r>
+          </a:p>
+        </p:txBody>
+      </p:sp>
     </p:spTree>
     <p:extLst>
       <p:ext uri="{BB962C8B-B14F-4D97-AF65-F5344CB8AC3E}">
@@ -5146,7 +5310,7 @@
 </p:sld>
 </file>
 
-<file path=ppt/slides/slide5.xml><?xml version="1.0" encoding="utf-8"?>
+<file path=ppt/slides/slide6.xml><?xml version="1.0" encoding="utf-8"?>
 <p:sld xmlns:a="http://schemas.openxmlformats.org/drawingml/2006/main" xmlns:r="http://schemas.openxmlformats.org/officeDocument/2006/relationships" xmlns:p="http://schemas.openxmlformats.org/presentationml/2006/main">
   <p:cSld>
     <p:spTree>

</xml_diff>